<commit_message>
SDA - week 10 update
</commit_message>
<xml_diff>
--- a/static/files/SDA/week8/lecture_week_8.pptx
+++ b/static/files/SDA/week8/lecture_week_8.pptx
@@ -5,7 +5,7 @@
     <p:sldMasterId id="2147483648" r:id="rId1"/>
   </p:sldMasterIdLst>
   <p:notesMasterIdLst>
-    <p:notesMasterId r:id="rId33"/>
+    <p:notesMasterId r:id="rId34"/>
   </p:notesMasterIdLst>
   <p:sldIdLst>
     <p:sldId id="256" r:id="rId2"/>
@@ -39,6 +39,7 @@
     <p:sldId id="285" r:id="rId30"/>
     <p:sldId id="418" r:id="rId31"/>
     <p:sldId id="315" r:id="rId32"/>
+    <p:sldId id="422" r:id="rId33"/>
   </p:sldIdLst>
   <p:sldSz cx="12192000" cy="6858000"/>
   <p:notesSz cx="7099300" cy="10234613"/>
@@ -238,7 +239,7 @@
           <a:p>
             <a:fld id="{8FEAE804-2177-420F-80EC-8435C849749E}" type="datetimeFigureOut">
               <a:rPr lang="nl-NL" smtClean="0"/>
-              <a:t>16-10-2023</a:t>
+              <a:t>24-10-2023</a:t>
             </a:fld>
             <a:endParaRPr lang="nl-NL"/>
           </a:p>
@@ -781,7 +782,7 @@
           <a:p>
             <a:fld id="{7758815F-D99B-4B41-95A2-A0AEC8FACC43}" type="datetimeFigureOut">
               <a:rPr lang="nl-NL" smtClean="0"/>
-              <a:t>16-10-2023</a:t>
+              <a:t>24-10-2023</a:t>
             </a:fld>
             <a:endParaRPr lang="nl-NL"/>
           </a:p>
@@ -951,7 +952,7 @@
           <a:p>
             <a:fld id="{7758815F-D99B-4B41-95A2-A0AEC8FACC43}" type="datetimeFigureOut">
               <a:rPr lang="nl-NL" smtClean="0"/>
-              <a:t>16-10-2023</a:t>
+              <a:t>24-10-2023</a:t>
             </a:fld>
             <a:endParaRPr lang="nl-NL"/>
           </a:p>
@@ -1131,7 +1132,7 @@
           <a:p>
             <a:fld id="{7758815F-D99B-4B41-95A2-A0AEC8FACC43}" type="datetimeFigureOut">
               <a:rPr lang="nl-NL" smtClean="0"/>
-              <a:t>16-10-2023</a:t>
+              <a:t>24-10-2023</a:t>
             </a:fld>
             <a:endParaRPr lang="nl-NL"/>
           </a:p>
@@ -1301,7 +1302,7 @@
           <a:p>
             <a:fld id="{7758815F-D99B-4B41-95A2-A0AEC8FACC43}" type="datetimeFigureOut">
               <a:rPr lang="nl-NL" smtClean="0"/>
-              <a:t>16-10-2023</a:t>
+              <a:t>24-10-2023</a:t>
             </a:fld>
             <a:endParaRPr lang="nl-NL"/>
           </a:p>
@@ -1547,7 +1548,7 @@
           <a:p>
             <a:fld id="{7758815F-D99B-4B41-95A2-A0AEC8FACC43}" type="datetimeFigureOut">
               <a:rPr lang="nl-NL" smtClean="0"/>
-              <a:t>16-10-2023</a:t>
+              <a:t>24-10-2023</a:t>
             </a:fld>
             <a:endParaRPr lang="nl-NL"/>
           </a:p>
@@ -1835,7 +1836,7 @@
           <a:p>
             <a:fld id="{7758815F-D99B-4B41-95A2-A0AEC8FACC43}" type="datetimeFigureOut">
               <a:rPr lang="nl-NL" smtClean="0"/>
-              <a:t>16-10-2023</a:t>
+              <a:t>24-10-2023</a:t>
             </a:fld>
             <a:endParaRPr lang="nl-NL"/>
           </a:p>
@@ -2257,7 +2258,7 @@
           <a:p>
             <a:fld id="{7758815F-D99B-4B41-95A2-A0AEC8FACC43}" type="datetimeFigureOut">
               <a:rPr lang="nl-NL" smtClean="0"/>
-              <a:t>16-10-2023</a:t>
+              <a:t>24-10-2023</a:t>
             </a:fld>
             <a:endParaRPr lang="nl-NL"/>
           </a:p>
@@ -2375,7 +2376,7 @@
           <a:p>
             <a:fld id="{7758815F-D99B-4B41-95A2-A0AEC8FACC43}" type="datetimeFigureOut">
               <a:rPr lang="nl-NL" smtClean="0"/>
-              <a:t>16-10-2023</a:t>
+              <a:t>24-10-2023</a:t>
             </a:fld>
             <a:endParaRPr lang="nl-NL"/>
           </a:p>
@@ -2470,7 +2471,7 @@
           <a:p>
             <a:fld id="{7758815F-D99B-4B41-95A2-A0AEC8FACC43}" type="datetimeFigureOut">
               <a:rPr lang="nl-NL" smtClean="0"/>
-              <a:t>16-10-2023</a:t>
+              <a:t>24-10-2023</a:t>
             </a:fld>
             <a:endParaRPr lang="nl-NL"/>
           </a:p>
@@ -2747,7 +2748,7 @@
           <a:p>
             <a:fld id="{7758815F-D99B-4B41-95A2-A0AEC8FACC43}" type="datetimeFigureOut">
               <a:rPr lang="nl-NL" smtClean="0"/>
-              <a:t>16-10-2023</a:t>
+              <a:t>24-10-2023</a:t>
             </a:fld>
             <a:endParaRPr lang="nl-NL"/>
           </a:p>
@@ -3000,7 +3001,7 @@
           <a:p>
             <a:fld id="{7758815F-D99B-4B41-95A2-A0AEC8FACC43}" type="datetimeFigureOut">
               <a:rPr lang="nl-NL" smtClean="0"/>
-              <a:t>16-10-2023</a:t>
+              <a:t>24-10-2023</a:t>
             </a:fld>
             <a:endParaRPr lang="nl-NL"/>
           </a:p>
@@ -3213,7 +3214,7 @@
           <a:p>
             <a:fld id="{7758815F-D99B-4B41-95A2-A0AEC8FACC43}" type="datetimeFigureOut">
               <a:rPr lang="nl-NL" smtClean="0"/>
-              <a:t>16-10-2023</a:t>
+              <a:t>24-10-2023</a:t>
             </a:fld>
             <a:endParaRPr lang="nl-NL"/>
           </a:p>
@@ -9492,7 +9493,7 @@
 </file>
 
 <file path=ppt/slides/slide29.xml><?xml version="1.0" encoding="utf-8"?>
-<p:sld xmlns:a="http://schemas.openxmlformats.org/drawingml/2006/main" xmlns:r="http://schemas.openxmlformats.org/officeDocument/2006/relationships" xmlns:p="http://schemas.openxmlformats.org/presentationml/2006/main">
+<p:sld xmlns:a="http://schemas.openxmlformats.org/drawingml/2006/main" xmlns:r="http://schemas.openxmlformats.org/officeDocument/2006/relationships" xmlns:p="http://schemas.openxmlformats.org/presentationml/2006/main" show="0">
   <p:cSld>
     <p:spTree>
       <p:nvGrpSpPr>
@@ -10187,6 +10188,183 @@
     <p:extLst>
       <p:ext uri="{BB962C8B-B14F-4D97-AF65-F5344CB8AC3E}">
         <p14:creationId xmlns:p14="http://schemas.microsoft.com/office/powerpoint/2010/main" val="4263769302"/>
+      </p:ext>
+    </p:extLst>
+  </p:cSld>
+  <p:clrMapOvr>
+    <a:masterClrMapping/>
+  </p:clrMapOvr>
+</p:sld>
+</file>
+
+<file path=ppt/slides/slide32.xml><?xml version="1.0" encoding="utf-8"?>
+<p:sld xmlns:a="http://schemas.openxmlformats.org/drawingml/2006/main" xmlns:r="http://schemas.openxmlformats.org/officeDocument/2006/relationships" xmlns:p="http://schemas.openxmlformats.org/presentationml/2006/main">
+  <p:cSld>
+    <p:spTree>
+      <p:nvGrpSpPr>
+        <p:cNvPr id="1" name=""/>
+        <p:cNvGrpSpPr/>
+        <p:nvPr/>
+      </p:nvGrpSpPr>
+      <p:grpSpPr>
+        <a:xfrm>
+          <a:off x="0" y="0"/>
+          <a:ext cx="0" cy="0"/>
+          <a:chOff x="0" y="0"/>
+          <a:chExt cx="0" cy="0"/>
+        </a:xfrm>
+      </p:grpSpPr>
+      <p:sp>
+        <p:nvSpPr>
+          <p:cNvPr id="2" name="Title 1">
+            <a:extLst>
+              <a:ext uri="{FF2B5EF4-FFF2-40B4-BE49-F238E27FC236}">
+                <a16:creationId xmlns:a16="http://schemas.microsoft.com/office/drawing/2014/main" id="{039E02A8-4978-30AE-A5B6-284F01148515}"/>
+              </a:ext>
+            </a:extLst>
+          </p:cNvPr>
+          <p:cNvSpPr>
+            <a:spLocks noGrp="1"/>
+          </p:cNvSpPr>
+          <p:nvPr>
+            <p:ph type="title"/>
+          </p:nvPr>
+        </p:nvSpPr>
+        <p:spPr/>
+        <p:txBody>
+          <a:bodyPr/>
+          <a:lstStyle/>
+          <a:p>
+            <a:r>
+              <a:rPr lang="en-US" dirty="0"/>
+              <a:t>Now: Exercise</a:t>
+            </a:r>
+            <a:endParaRPr lang="nl-NL" dirty="0"/>
+          </a:p>
+        </p:txBody>
+      </p:sp>
+      <p:sp>
+        <p:nvSpPr>
+          <p:cNvPr id="3" name="Content Placeholder 2">
+            <a:extLst>
+              <a:ext uri="{FF2B5EF4-FFF2-40B4-BE49-F238E27FC236}">
+                <a16:creationId xmlns:a16="http://schemas.microsoft.com/office/drawing/2014/main" id="{2F20B41C-215A-B3E9-25E1-34C0C1B34D5D}"/>
+              </a:ext>
+            </a:extLst>
+          </p:cNvPr>
+          <p:cNvSpPr>
+            <a:spLocks noGrp="1"/>
+          </p:cNvSpPr>
+          <p:nvPr>
+            <p:ph idx="1"/>
+          </p:nvPr>
+        </p:nvSpPr>
+        <p:spPr/>
+        <p:txBody>
+          <a:bodyPr/>
+          <a:lstStyle/>
+          <a:p>
+            <a:r>
+              <a:rPr lang="en-US" dirty="0"/>
+              <a:t>European Social Survey</a:t>
+            </a:r>
+          </a:p>
+          <a:p>
+            <a:pPr lvl="1"/>
+            <a:r>
+              <a:rPr lang="en-US" dirty="0"/>
+              <a:t>Hungary and Slovakia only</a:t>
+            </a:r>
+          </a:p>
+          <a:p>
+            <a:r>
+              <a:rPr lang="nl-NL" dirty="0" err="1"/>
+              <a:t>Explore</a:t>
+            </a:r>
+            <a:r>
+              <a:rPr lang="nl-NL" dirty="0"/>
+              <a:t> and </a:t>
+            </a:r>
+            <a:r>
+              <a:rPr lang="nl-NL" dirty="0" err="1"/>
+              <a:t>understand</a:t>
+            </a:r>
+            <a:r>
+              <a:rPr lang="nl-NL" dirty="0"/>
+              <a:t> different </a:t>
+            </a:r>
+            <a:r>
+              <a:rPr lang="nl-NL" dirty="0" err="1"/>
+              <a:t>weights</a:t>
+            </a:r>
+            <a:r>
+              <a:rPr lang="nl-NL" dirty="0"/>
+              <a:t> in dataset</a:t>
+            </a:r>
+          </a:p>
+          <a:p>
+            <a:r>
+              <a:rPr lang="nl-NL" dirty="0"/>
+              <a:t>How does </a:t>
+            </a:r>
+            <a:r>
+              <a:rPr lang="nl-NL" dirty="0" err="1"/>
+              <a:t>weighting</a:t>
+            </a:r>
+            <a:r>
+              <a:rPr lang="nl-NL" dirty="0"/>
+              <a:t> matter?</a:t>
+            </a:r>
+          </a:p>
+          <a:p>
+            <a:pPr lvl="1"/>
+            <a:r>
+              <a:rPr lang="nl-NL" dirty="0"/>
+              <a:t>Point </a:t>
+            </a:r>
+            <a:r>
+              <a:rPr lang="nl-NL" dirty="0" err="1"/>
+              <a:t>estimates</a:t>
+            </a:r>
+            <a:endParaRPr lang="nl-NL" dirty="0"/>
+          </a:p>
+          <a:p>
+            <a:pPr lvl="1"/>
+            <a:r>
+              <a:rPr lang="nl-NL" dirty="0" err="1"/>
+              <a:t>Variances</a:t>
+            </a:r>
+            <a:endParaRPr lang="nl-NL" dirty="0"/>
+          </a:p>
+          <a:p>
+            <a:pPr lvl="1"/>
+            <a:endParaRPr lang="nl-NL" dirty="0"/>
+          </a:p>
+          <a:p>
+            <a:r>
+              <a:rPr lang="nl-NL" dirty="0"/>
+              <a:t>Finish at home, </a:t>
+            </a:r>
+            <a:r>
+              <a:rPr lang="nl-NL" dirty="0" err="1"/>
+              <a:t>before</a:t>
+            </a:r>
+            <a:r>
+              <a:rPr lang="nl-NL" dirty="0"/>
+              <a:t> next </a:t>
+            </a:r>
+            <a:r>
+              <a:rPr lang="nl-NL" dirty="0" err="1"/>
+              <a:t>lecture</a:t>
+            </a:r>
+            <a:endParaRPr lang="nl-NL" dirty="0"/>
+          </a:p>
+        </p:txBody>
+      </p:sp>
+    </p:spTree>
+    <p:extLst>
+      <p:ext uri="{BB962C8B-B14F-4D97-AF65-F5344CB8AC3E}">
+        <p14:creationId xmlns:p14="http://schemas.microsoft.com/office/powerpoint/2010/main" val="1695644577"/>
       </p:ext>
     </p:extLst>
   </p:cSld>

</xml_diff>